<commit_message>
High Level Workflow v2
</commit_message>
<xml_diff>
--- a/Product/High-Level-Workflow.pptx
+++ b/Product/High-Level-Workflow.pptx
@@ -3814,6 +3814,34 @@
               <a:t>Registration form</a:t>
             </a:r>
           </a:p>
+          <a:p>
+            <a:pPr marL="342900" indent="-342900">
+              <a:buFont typeface="+mj-lt"/>
+              <a:buAutoNum type="arabicPeriod"/>
+            </a:pPr>
+            <a:r>
+              <a:rPr lang="en-US" sz="1400" dirty="0">
+                <a:solidFill>
+                  <a:schemeClr val="tx1"/>
+                </a:solidFill>
+              </a:rPr>
+              <a:t>If admin sign in: All fields enabled.</a:t>
+            </a:r>
+          </a:p>
+          <a:p>
+            <a:pPr marL="342900" indent="-342900">
+              <a:buFont typeface="+mj-lt"/>
+              <a:buAutoNum type="arabicPeriod"/>
+            </a:pPr>
+            <a:r>
+              <a:rPr lang="en-US" sz="1400" dirty="0">
+                <a:solidFill>
+                  <a:schemeClr val="tx1"/>
+                </a:solidFill>
+              </a:rPr>
+              <a:t>Else, User ID as non editable email</a:t>
+            </a:r>
+          </a:p>
         </p:txBody>
       </p:sp>
       <p:sp>
@@ -3895,21 +3923,41 @@
           <a:p>
             <a:pPr algn="ctr"/>
             <a:r>
+              <a:rPr lang="en-US" sz="1300" b="1" dirty="0">
+                <a:solidFill>
+                  <a:schemeClr val="tx1"/>
+                </a:solidFill>
+              </a:rPr>
+              <a:t>Save user</a:t>
+            </a:r>
+          </a:p>
+          <a:p>
+            <a:pPr marL="342900" indent="-342900">
+              <a:buFont typeface="+mj-lt"/>
+              <a:buAutoNum type="arabicPeriod"/>
+            </a:pPr>
+            <a:r>
               <a:rPr lang="en-US" sz="1300" dirty="0">
                 <a:solidFill>
                   <a:schemeClr val="tx1"/>
                 </a:solidFill>
               </a:rPr>
-              <a:t>New user created</a:t>
-            </a:r>
-          </a:p>
-          <a:p>
-            <a:pPr algn="ctr"/>
-            <a:endParaRPr lang="en-US" sz="1300" b="1" dirty="0">
-              <a:solidFill>
-                <a:schemeClr val="tx1"/>
-              </a:solidFill>
-            </a:endParaRPr>
+              <a:t>If admin sign in: Save user with role Director</a:t>
+            </a:r>
+          </a:p>
+          <a:p>
+            <a:pPr marL="342900" indent="-342900">
+              <a:buFont typeface="+mj-lt"/>
+              <a:buAutoNum type="arabicPeriod"/>
+            </a:pPr>
+            <a:r>
+              <a:rPr lang="en-US" sz="1300" dirty="0">
+                <a:solidFill>
+                  <a:schemeClr val="tx1"/>
+                </a:solidFill>
+              </a:rPr>
+              <a:t>Else, role is assigned when member is added.</a:t>
+            </a:r>
           </a:p>
         </p:txBody>
       </p:sp>
@@ -4056,15 +4104,13 @@
           </p:cNvPr>
           <p:cNvCxnSpPr>
             <a:cxnSpLocks/>
-            <a:stCxn id="202" idx="3"/>
-            <a:endCxn id="198" idx="1"/>
           </p:cNvCxnSpPr>
           <p:nvPr/>
         </p:nvCxnSpPr>
         <p:spPr>
-          <a:xfrm>
-            <a:off x="5075494" y="1233895"/>
-            <a:ext cx="1273155" cy="1074"/>
+          <a:xfrm flipV="1">
+            <a:off x="5048296" y="1225735"/>
+            <a:ext cx="1741875" cy="6065"/>
           </a:xfrm>
           <a:prstGeom prst="straightConnector1">
             <a:avLst/>
@@ -4106,8 +4152,8 @@
         </p:nvCxnSpPr>
         <p:spPr>
           <a:xfrm>
-            <a:off x="7937999" y="1234969"/>
-            <a:ext cx="1385975" cy="0"/>
+            <a:off x="8379521" y="1225735"/>
+            <a:ext cx="944453" cy="9234"/>
           </a:xfrm>
           <a:prstGeom prst="straightConnector1">
             <a:avLst/>
@@ -4395,7 +4441,7 @@
         </p:nvCxnSpPr>
         <p:spPr>
           <a:xfrm flipH="1">
-            <a:off x="7137580" y="1945268"/>
+            <a:off x="7579102" y="1936034"/>
             <a:ext cx="5744" cy="508935"/>
           </a:xfrm>
           <a:prstGeom prst="straightConnector1">
@@ -4434,7 +4480,7 @@
         </p:nvSpPr>
         <p:spPr>
           <a:xfrm>
-            <a:off x="6865626" y="2122229"/>
+            <a:off x="7307148" y="2112995"/>
             <a:ext cx="284052" cy="338554"/>
           </a:xfrm>
           <a:prstGeom prst="rect">
@@ -5082,8 +5128,8 @@
         </p:nvCxnSpPr>
         <p:spPr>
           <a:xfrm rot="5400000" flipH="1" flipV="1">
-            <a:off x="4297363" y="4134240"/>
-            <a:ext cx="2855921" cy="678048"/>
+            <a:off x="4320343" y="4083079"/>
+            <a:ext cx="2781779" cy="706229"/>
           </a:xfrm>
           <a:prstGeom prst="bentConnector2">
             <a:avLst/>
@@ -5589,6 +5635,86 @@
           </a:fontRef>
         </p:style>
       </p:cxnSp>
+      <p:cxnSp>
+        <p:nvCxnSpPr>
+          <p:cNvPr id="184" name="Elbow Connector 183">
+            <a:extLst>
+              <a:ext uri="{FF2B5EF4-FFF2-40B4-BE49-F238E27FC236}">
+                <a16:creationId xmlns:a16="http://schemas.microsoft.com/office/drawing/2014/main" id="{9FF66E59-D005-B440-8B2F-4D1FA39F7B06}"/>
+              </a:ext>
+            </a:extLst>
+          </p:cNvPr>
+          <p:cNvCxnSpPr>
+            <a:cxnSpLocks/>
+            <a:stCxn id="202" idx="2"/>
+            <a:endCxn id="18" idx="0"/>
+          </p:cNvCxnSpPr>
+          <p:nvPr/>
+        </p:nvCxnSpPr>
+        <p:spPr>
+          <a:xfrm rot="5400000">
+            <a:off x="2479513" y="817630"/>
+            <a:ext cx="674743" cy="2927871"/>
+          </a:xfrm>
+          <a:prstGeom prst="bentConnector3">
+            <a:avLst>
+              <a:gd name="adj1" fmla="val 50000"/>
+            </a:avLst>
+          </a:prstGeom>
+          <a:ln>
+            <a:tailEnd type="triangle"/>
+          </a:ln>
+        </p:spPr>
+        <p:style>
+          <a:lnRef idx="1">
+            <a:schemeClr val="accent1"/>
+          </a:lnRef>
+          <a:fillRef idx="0">
+            <a:schemeClr val="accent1"/>
+          </a:fillRef>
+          <a:effectRef idx="0">
+            <a:schemeClr val="accent1"/>
+          </a:effectRef>
+          <a:fontRef idx="minor">
+            <a:schemeClr val="tx1"/>
+          </a:fontRef>
+        </p:style>
+      </p:cxnSp>
+      <p:sp>
+        <p:nvSpPr>
+          <p:cNvPr id="186" name="TextBox 185">
+            <a:extLst>
+              <a:ext uri="{FF2B5EF4-FFF2-40B4-BE49-F238E27FC236}">
+                <a16:creationId xmlns:a16="http://schemas.microsoft.com/office/drawing/2014/main" id="{A53264F3-718F-7A43-B871-F1C3D20DC28D}"/>
+              </a:ext>
+            </a:extLst>
+          </p:cNvPr>
+          <p:cNvSpPr txBox="1"/>
+          <p:nvPr/>
+        </p:nvSpPr>
+        <p:spPr>
+          <a:xfrm>
+            <a:off x="4246345" y="1906658"/>
+            <a:ext cx="284052" cy="338554"/>
+          </a:xfrm>
+          <a:prstGeom prst="rect">
+            <a:avLst/>
+          </a:prstGeom>
+          <a:noFill/>
+        </p:spPr>
+        <p:txBody>
+          <a:bodyPr wrap="none" rtlCol="0">
+            <a:spAutoFit/>
+          </a:bodyPr>
+          <a:lstStyle/>
+          <a:p>
+            <a:r>
+              <a:rPr lang="en-US" sz="1600" dirty="0"/>
+              <a:t>Y</a:t>
+            </a:r>
+          </a:p>
+        </p:txBody>
+      </p:sp>
       <p:sp>
         <p:nvSpPr>
           <p:cNvPr id="187" name="TextBox 186">
@@ -5684,7 +5810,7 @@
         </p:nvSpPr>
         <p:spPr>
           <a:xfrm>
-            <a:off x="6348649" y="524669"/>
+            <a:off x="6790171" y="515435"/>
             <a:ext cx="1589350" cy="1420599"/>
           </a:xfrm>
           <a:prstGeom prst="diamond">
@@ -5841,6 +5967,168 @@
           </a:prstGeom>
           <a:solidFill>
             <a:schemeClr val="accent6"/>
+          </a:solidFill>
+        </p:spPr>
+        <p:style>
+          <a:lnRef idx="2">
+            <a:schemeClr val="accent1">
+              <a:shade val="50000"/>
+            </a:schemeClr>
+          </a:lnRef>
+          <a:fillRef idx="1">
+            <a:schemeClr val="accent1"/>
+          </a:fillRef>
+          <a:effectRef idx="0">
+            <a:schemeClr val="accent1"/>
+          </a:effectRef>
+          <a:fontRef idx="minor">
+            <a:schemeClr val="lt1"/>
+          </a:fontRef>
+        </p:style>
+        <p:txBody>
+          <a:bodyPr rtlCol="0" anchor="ctr"/>
+          <a:lstStyle/>
+          <a:p>
+            <a:pPr algn="ctr"/>
+            <a:endParaRPr lang="en-US"/>
+          </a:p>
+        </p:txBody>
+      </p:sp>
+      <p:sp>
+        <p:nvSpPr>
+          <p:cNvPr id="221" name="Rectangle 220">
+            <a:extLst>
+              <a:ext uri="{FF2B5EF4-FFF2-40B4-BE49-F238E27FC236}">
+                <a16:creationId xmlns:a16="http://schemas.microsoft.com/office/drawing/2014/main" id="{A20217A0-37EA-E546-BC88-CAAC759068C4}"/>
+              </a:ext>
+            </a:extLst>
+          </p:cNvPr>
+          <p:cNvSpPr/>
+          <p:nvPr/>
+        </p:nvSpPr>
+        <p:spPr>
+          <a:xfrm>
+            <a:off x="2454405" y="5829615"/>
+            <a:ext cx="1740676" cy="950097"/>
+          </a:xfrm>
+          <a:prstGeom prst="rect">
+            <a:avLst/>
+          </a:prstGeom>
+          <a:noFill/>
+        </p:spPr>
+        <p:style>
+          <a:lnRef idx="2">
+            <a:schemeClr val="accent1">
+              <a:shade val="50000"/>
+            </a:schemeClr>
+          </a:lnRef>
+          <a:fillRef idx="1">
+            <a:schemeClr val="accent1"/>
+          </a:fillRef>
+          <a:effectRef idx="0">
+            <a:schemeClr val="accent1"/>
+          </a:effectRef>
+          <a:fontRef idx="minor">
+            <a:schemeClr val="lt1"/>
+          </a:fontRef>
+        </p:style>
+        <p:txBody>
+          <a:bodyPr rtlCol="0" anchor="ctr"/>
+          <a:lstStyle/>
+          <a:p>
+            <a:pPr algn="ctr"/>
+            <a:r>
+              <a:rPr lang="en-US" sz="1400" dirty="0">
+                <a:solidFill>
+                  <a:schemeClr val="tx1"/>
+                </a:solidFill>
+              </a:rPr>
+              <a:t>Disable ”admin” user.</a:t>
+            </a:r>
+          </a:p>
+          <a:p>
+            <a:pPr algn="ctr"/>
+            <a:r>
+              <a:rPr lang="en-US" sz="1400" dirty="0">
+                <a:solidFill>
+                  <a:schemeClr val="tx1"/>
+                </a:solidFill>
+              </a:rPr>
+              <a:t>Any future sign in with this user should fail.</a:t>
+            </a:r>
+          </a:p>
+        </p:txBody>
+      </p:sp>
+      <p:cxnSp>
+        <p:nvCxnSpPr>
+          <p:cNvPr id="223" name="Elbow Connector 222">
+            <a:extLst>
+              <a:ext uri="{FF2B5EF4-FFF2-40B4-BE49-F238E27FC236}">
+                <a16:creationId xmlns:a16="http://schemas.microsoft.com/office/drawing/2014/main" id="{6C3457D0-EFA1-3F42-8B75-A6625BDBAC13}"/>
+              </a:ext>
+            </a:extLst>
+          </p:cNvPr>
+          <p:cNvCxnSpPr>
+            <a:cxnSpLocks/>
+            <a:stCxn id="248" idx="3"/>
+            <a:endCxn id="221" idx="0"/>
+          </p:cNvCxnSpPr>
+          <p:nvPr/>
+        </p:nvCxnSpPr>
+        <p:spPr>
+          <a:xfrm>
+            <a:off x="2199503" y="5053914"/>
+            <a:ext cx="1125240" cy="775701"/>
+          </a:xfrm>
+          <a:prstGeom prst="bentConnector2">
+            <a:avLst/>
+          </a:prstGeom>
+          <a:ln>
+            <a:prstDash val="dash"/>
+            <a:tailEnd type="triangle"/>
+          </a:ln>
+        </p:spPr>
+        <p:style>
+          <a:lnRef idx="1">
+            <a:schemeClr val="accent1"/>
+          </a:lnRef>
+          <a:fillRef idx="0">
+            <a:schemeClr val="accent1"/>
+          </a:fillRef>
+          <a:effectRef idx="0">
+            <a:schemeClr val="accent1"/>
+          </a:effectRef>
+          <a:fontRef idx="minor">
+            <a:schemeClr val="tx1"/>
+          </a:fontRef>
+        </p:style>
+      </p:cxnSp>
+      <p:sp>
+        <p:nvSpPr>
+          <p:cNvPr id="248" name="Rectangle 247">
+            <a:extLst>
+              <a:ext uri="{FF2B5EF4-FFF2-40B4-BE49-F238E27FC236}">
+                <a16:creationId xmlns:a16="http://schemas.microsoft.com/office/drawing/2014/main" id="{871BFFE3-05F1-E446-887B-C4D639B36BBE}"/>
+              </a:ext>
+            </a:extLst>
+          </p:cNvPr>
+          <p:cNvSpPr/>
+          <p:nvPr/>
+        </p:nvSpPr>
+        <p:spPr>
+          <a:xfrm>
+            <a:off x="725193" y="4769708"/>
+            <a:ext cx="1474310" cy="568411"/>
+          </a:xfrm>
+          <a:prstGeom prst="rect">
+            <a:avLst/>
+          </a:prstGeom>
+          <a:solidFill>
+            <a:schemeClr val="accent5">
+              <a:lumMod val="20000"/>
+              <a:lumOff val="80000"/>
+              <a:alpha val="35000"/>
+            </a:schemeClr>
           </a:solidFill>
         </p:spPr>
         <p:style>

</xml_diff>